<commit_message>
content: Minor updates on slides (Sequences Part 2)
</commit_message>
<xml_diff>
--- a/source/sequences/_static/sorting/simple_sorting.pptx
+++ b/source/sequences/_static/sorting/simple_sorting.pptx
@@ -232,7 +232,7 @@
           <a:p>
             <a:fld id="{84F29782-C61A-CD4C-9376-B0A272778357}" type="datetimeFigureOut">
               <a:rPr lang="en-NO" smtClean="0"/>
-              <a:t>12/09/2022</a:t>
+              <a:t>11/09/2023</a:t>
             </a:fld>
             <a:endParaRPr lang="en-NO"/>
           </a:p>
@@ -4587,17 +4587,17 @@
           <a:p>
             <a:r>
               <a:rPr lang="en-GB" noProof="0" dirty="0"/>
-              <a:t>Week 4 / Lecture 2</a:t>
+              <a:t>Sequences / Lecture 5</a:t>
             </a:r>
           </a:p>
         </p:txBody>
       </p:sp>
       <p:sp>
         <p:nvSpPr>
-          <p:cNvPr id="8" name="TextBox 7">
+          <p:cNvPr id="9" name="TextBox 8">
             <a:extLst>
               <a:ext uri="{FF2B5EF4-FFF2-40B4-BE49-F238E27FC236}">
-                <a16:creationId xmlns:a16="http://schemas.microsoft.com/office/drawing/2014/main" id="{19EF15BE-00BA-80C2-533D-35357002CD2B}"/>
+                <a16:creationId xmlns:a16="http://schemas.microsoft.com/office/drawing/2014/main" id="{3D6F01FD-1144-FFFF-F931-71A767089569}"/>
               </a:ext>
             </a:extLst>
           </p:cNvPr>
@@ -4606,8 +4606,8 @@
         </p:nvSpPr>
         <p:spPr>
           <a:xfrm>
-            <a:off x="7555955" y="5449153"/>
-            <a:ext cx="3910045" cy="830997"/>
+            <a:off x="8446190" y="5113247"/>
+            <a:ext cx="3348994" cy="1200329"/>
           </a:xfrm>
           <a:prstGeom prst="rect">
             <a:avLst/>
@@ -4628,8 +4628,16 @@
                 </a:solidFill>
                 <a:latin typeface="Montserrat" pitchFamily="2" charset="77"/>
               </a:rPr>
-              <a:t>Go to </a:t>
-            </a:r>
+              <a:t>Ask anything on </a:t>
+            </a:r>
+            <a:br>
+              <a:rPr lang="en-GB" sz="2400" i="1" dirty="0">
+                <a:solidFill>
+                  <a:schemeClr val="accent6"/>
+                </a:solidFill>
+                <a:latin typeface="Montserrat" pitchFamily="2" charset="77"/>
+              </a:rPr>
+            </a:br>
             <a:r>
               <a:rPr lang="en-GB" sz="2400" b="1" i="1" dirty="0" err="1">
                 <a:solidFill>
@@ -4655,7 +4663,7 @@
                 </a:solidFill>
                 <a:latin typeface="Montserrat" pitchFamily="2" charset="77"/>
               </a:rPr>
-              <a:t>use the code </a:t>
+              <a:t>with code </a:t>
             </a:r>
             <a:r>
               <a:rPr lang="en-GB" sz="2400" b="1" i="1" dirty="0">
@@ -4664,7 +4672,7 @@
                 </a:solidFill>
                 <a:latin typeface="Montserrat" pitchFamily="2" charset="77"/>
               </a:rPr>
-              <a:t>89 05 90 0</a:t>
+              <a:t>8466 4411</a:t>
             </a:r>
             <a:endParaRPr lang="en-GB" sz="2400" i="1" dirty="0">
               <a:solidFill>

</xml_diff>